<commit_message>
Changed poster.pptx and added defesa.pptx
</commit_message>
<xml_diff>
--- a/poster.pptx
+++ b/poster.pptx
@@ -156,6 +156,10 @@
 </p:presentation>
 </file>
 
+<file path=ppt/revisionInfo.xml><?xml version="1.0" encoding="utf-8"?>
+<p1510:revInfo xmlns:a="http://schemas.openxmlformats.org/drawingml/2006/main" xmlns:r="http://schemas.openxmlformats.org/officeDocument/2006/relationships" xmlns:p1510="http://schemas.microsoft.com/office/powerpoint/2015/10/main"/>
+</file>
+
 <file path=ppt/notesMasters/notesMaster1.xml><?xml version="1.0" encoding="utf-8"?>
 <p:notesMaster xmlns:a="http://schemas.openxmlformats.org/drawingml/2006/main" xmlns:r="http://schemas.openxmlformats.org/officeDocument/2006/relationships" xmlns:p="http://schemas.openxmlformats.org/presentationml/2006/main">
   <p:cSld>
@@ -276,7 +280,7 @@
               <a:pPr>
                 <a:defRPr/>
               </a:pPr>
-              <a:t>26/08/2017</a:t>
+              <a:t>08/11/2017</a:t>
             </a:fld>
             <a:endParaRPr lang="pt-BR"/>
           </a:p>
@@ -485,7 +489,7 @@
     </p:spTree>
     <p:extLst>
       <p:ext uri="{BB962C8B-B14F-4D97-AF65-F5344CB8AC3E}">
-        <p14:creationId xmlns:p14="http://schemas.microsoft.com/office/powerpoint/2010/main" val="3705900494"/>
+        <p14:creationId xmlns:p14="http://schemas.microsoft.com/office/powerpoint/2010/main" val="2993951780"/>
       </p:ext>
     </p:extLst>
   </p:cSld>
@@ -860,7 +864,7 @@
     </p:spTree>
     <p:extLst>
       <p:ext uri="{BB962C8B-B14F-4D97-AF65-F5344CB8AC3E}">
-        <p14:creationId xmlns:p14="http://schemas.microsoft.com/office/powerpoint/2010/main" val="1261596303"/>
+        <p14:creationId xmlns:p14="http://schemas.microsoft.com/office/powerpoint/2010/main" val="915257894"/>
       </p:ext>
     </p:extLst>
   </p:cSld>
@@ -1059,7 +1063,7 @@
               <a:pPr>
                 <a:defRPr/>
               </a:pPr>
-              <a:t>26/08/2017</a:t>
+              <a:t>08/11/2017</a:t>
             </a:fld>
             <a:endParaRPr lang="pt-BR" dirty="0"/>
           </a:p>
@@ -1249,7 +1253,7 @@
               <a:pPr>
                 <a:defRPr/>
               </a:pPr>
-              <a:t>26/08/2017</a:t>
+              <a:t>08/11/2017</a:t>
             </a:fld>
             <a:endParaRPr lang="pt-BR" dirty="0"/>
           </a:p>
@@ -1449,7 +1453,7 @@
               <a:pPr>
                 <a:defRPr/>
               </a:pPr>
-              <a:t>26/08/2017</a:t>
+              <a:t>08/11/2017</a:t>
             </a:fld>
             <a:endParaRPr lang="pt-BR" dirty="0"/>
           </a:p>
@@ -1639,7 +1643,7 @@
               <a:pPr>
                 <a:defRPr/>
               </a:pPr>
-              <a:t>26/08/2017</a:t>
+              <a:t>08/11/2017</a:t>
             </a:fld>
             <a:endParaRPr lang="pt-BR" dirty="0"/>
           </a:p>
@@ -1906,7 +1910,7 @@
               <a:pPr>
                 <a:defRPr/>
               </a:pPr>
-              <a:t>26/08/2017</a:t>
+              <a:t>08/11/2017</a:t>
             </a:fld>
             <a:endParaRPr lang="pt-BR" dirty="0"/>
           </a:p>
@@ -2213,7 +2217,7 @@
               <a:pPr>
                 <a:defRPr/>
               </a:pPr>
-              <a:t>26/08/2017</a:t>
+              <a:t>08/11/2017</a:t>
             </a:fld>
             <a:endParaRPr lang="pt-BR" dirty="0"/>
           </a:p>
@@ -2659,7 +2663,7 @@
               <a:pPr>
                 <a:defRPr/>
               </a:pPr>
-              <a:t>26/08/2017</a:t>
+              <a:t>08/11/2017</a:t>
             </a:fld>
             <a:endParaRPr lang="pt-BR" dirty="0"/>
           </a:p>
@@ -2798,7 +2802,7 @@
               <a:pPr>
                 <a:defRPr/>
               </a:pPr>
-              <a:t>26/08/2017</a:t>
+              <a:t>08/11/2017</a:t>
             </a:fld>
             <a:endParaRPr lang="pt-BR" dirty="0"/>
           </a:p>
@@ -2915,7 +2919,7 @@
               <a:pPr>
                 <a:defRPr/>
               </a:pPr>
-              <a:t>26/08/2017</a:t>
+              <a:t>08/11/2017</a:t>
             </a:fld>
             <a:endParaRPr lang="pt-BR" dirty="0"/>
           </a:p>
@@ -3212,7 +3216,7 @@
               <a:pPr>
                 <a:defRPr/>
               </a:pPr>
-              <a:t>26/08/2017</a:t>
+              <a:t>08/11/2017</a:t>
             </a:fld>
             <a:endParaRPr lang="pt-BR" dirty="0"/>
           </a:p>
@@ -3489,7 +3493,7 @@
               <a:pPr>
                 <a:defRPr/>
               </a:pPr>
-              <a:t>26/08/2017</a:t>
+              <a:t>08/11/2017</a:t>
             </a:fld>
             <a:endParaRPr lang="pt-BR" dirty="0"/>
           </a:p>
@@ -3779,7 +3783,7 @@
               <a:pPr>
                 <a:defRPr/>
               </a:pPr>
-              <a:t>26/08/2017</a:t>
+              <a:t>08/11/2017</a:t>
             </a:fld>
             <a:endParaRPr lang="pt-BR" dirty="0"/>
           </a:p>
@@ -4406,7 +4410,7 @@
               <a:defRPr/>
             </a:pPr>
             <a:r>
-              <a:rPr lang="pt-BR" sz="2400" b="1" dirty="0" smtClean="0">
+              <a:rPr lang="pt-BR" sz="2400" b="1" dirty="0">
                 <a:solidFill>
                   <a:schemeClr val="bg1"/>
                 </a:solidFill>
@@ -4417,25 +4421,9 @@
                 </a:effectLst>
                 <a:latin typeface="Calibri" pitchFamily="34" charset="0"/>
               </a:rPr>
-              <a:t>SISTEMA DE SIMPLIFICAÇÃO E RESOLUÇÃO DE EXPRESSÕES ALGÉBRICAS</a:t>
-            </a:r>
-            <a:endParaRPr lang="pt-BR" sz="2400" b="1" dirty="0">
-              <a:solidFill>
-                <a:schemeClr val="bg1"/>
-              </a:solidFill>
-              <a:effectLst>
-                <a:outerShdw blurRad="38100" dist="38100" dir="2700000" algn="tl">
-                  <a:srgbClr val="EEECE1"/>
-                </a:outerShdw>
-              </a:effectLst>
-              <a:latin typeface="Calibri" pitchFamily="34" charset="0"/>
-            </a:endParaRPr>
-          </a:p>
-          <a:p>
-            <a:pPr algn="ctr">
-              <a:defRPr/>
-            </a:pPr>
-            <a:endParaRPr lang="pt-BR" dirty="0">
+              <a:t>SOFTWARE DE SIMPLIFICAÇÃO E RESOLUÇÃO DE EXPRESSÕES ALGÉBRICAS</a:t>
+            </a:r>
+            <a:endParaRPr lang="pt-BR" sz="2400" dirty="0">
               <a:solidFill>
                 <a:schemeClr val="bg1"/>
               </a:solidFill>
@@ -4600,77 +4588,41 @@
               <a:t>Discente: </a:t>
             </a:r>
             <a:r>
-              <a:rPr lang="pt-BR" altLang="pt-BR" sz="1800" b="1" dirty="0" err="1" smtClean="0">
-                <a:solidFill>
-                  <a:srgbClr val="FF0000"/>
-                </a:solidFill>
+              <a:rPr lang="pt-BR" altLang="pt-BR" sz="1800" b="1" dirty="0" err="1">
                 <a:latin typeface="Calibri" panose="020F0502020204030204" pitchFamily="34" charset="0"/>
               </a:rPr>
               <a:t>Antonio</a:t>
             </a:r>
             <a:r>
-              <a:rPr lang="pt-BR" altLang="pt-BR" sz="1800" b="1" dirty="0" smtClean="0">
-                <a:solidFill>
-                  <a:srgbClr val="FF0000"/>
-                </a:solidFill>
-                <a:latin typeface="Calibri" panose="020F0502020204030204" pitchFamily="34" charset="0"/>
-              </a:rPr>
-              <a:t> Raphael de Arruda Basso</a:t>
-            </a:r>
-            <a:r>
-              <a:rPr lang="pt-BR" altLang="pt-BR" sz="1800" b="1" dirty="0" smtClean="0">
-                <a:latin typeface="Calibri" panose="020F0502020204030204" pitchFamily="34" charset="0"/>
-              </a:rPr>
-              <a:t>                   Docente </a:t>
-            </a:r>
-            <a:r>
               <a:rPr lang="pt-BR" altLang="pt-BR" sz="1800" b="1" dirty="0">
                 <a:latin typeface="Calibri" panose="020F0502020204030204" pitchFamily="34" charset="0"/>
               </a:rPr>
-              <a:t>Orientador:  </a:t>
-            </a:r>
-            <a:r>
-              <a:rPr lang="pt-BR" altLang="pt-BR" sz="1800" b="1" dirty="0" err="1" smtClean="0">
-                <a:solidFill>
-                  <a:srgbClr val="FF0000"/>
-                </a:solidFill>
+              <a:t> Raphael de Arruda Basso                   Docente Orientador:  </a:t>
+            </a:r>
+            <a:r>
+              <a:rPr lang="pt-BR" altLang="pt-BR" sz="1800" b="1" dirty="0" err="1">
                 <a:latin typeface="Calibri" panose="020F0502020204030204" pitchFamily="34" charset="0"/>
               </a:rPr>
               <a:t>Odahyr</a:t>
             </a:r>
             <a:r>
-              <a:rPr lang="pt-BR" altLang="pt-BR" sz="1800" b="1" dirty="0" smtClean="0">
-                <a:solidFill>
-                  <a:srgbClr val="FF0000"/>
-                </a:solidFill>
+              <a:rPr lang="pt-BR" altLang="pt-BR" sz="1800" b="1" dirty="0">
                 <a:latin typeface="Calibri" panose="020F0502020204030204" pitchFamily="34" charset="0"/>
               </a:rPr>
               <a:t> </a:t>
             </a:r>
             <a:r>
-              <a:rPr lang="pt-BR" altLang="pt-BR" sz="1800" b="1" dirty="0" err="1" smtClean="0">
-                <a:solidFill>
-                  <a:srgbClr val="FF0000"/>
-                </a:solidFill>
+              <a:rPr lang="pt-BR" altLang="pt-BR" sz="1800" b="1" dirty="0" err="1">
                 <a:latin typeface="Calibri" panose="020F0502020204030204" pitchFamily="34" charset="0"/>
               </a:rPr>
               <a:t>Cavalini</a:t>
             </a:r>
             <a:r>
-              <a:rPr lang="pt-BR" altLang="pt-BR" sz="1800" b="1" dirty="0" smtClean="0">
-                <a:solidFill>
-                  <a:srgbClr val="FF0000"/>
-                </a:solidFill>
+              <a:rPr lang="pt-BR" altLang="pt-BR" sz="1800" b="1" dirty="0">
                 <a:latin typeface="Calibri" panose="020F0502020204030204" pitchFamily="34" charset="0"/>
               </a:rPr>
               <a:t> Júnior</a:t>
             </a:r>
-            <a:endParaRPr lang="pt-BR" altLang="pt-BR" sz="1800" b="1" dirty="0">
-              <a:solidFill>
-                <a:srgbClr val="FF0000"/>
-              </a:solidFill>
-              <a:latin typeface="Calibri" panose="020F0502020204030204" pitchFamily="34" charset="0"/>
-            </a:endParaRPr>
           </a:p>
         </p:txBody>
       </p:sp>
@@ -4689,9 +4641,7 @@
             <a:avLst/>
           </a:prstGeom>
           <a:solidFill>
-            <a:schemeClr val="bg2">
-              <a:lumMod val="50000"/>
-            </a:schemeClr>
+            <a:srgbClr val="717FB3"/>
           </a:solidFill>
           <a:ln>
             <a:solidFill>
@@ -4887,135 +4837,78 @@
             </a:lvl9pPr>
           </a:lstStyle>
           <a:p>
-            <a:pPr algn="just" eaLnBrk="1" hangingPunct="1"/>
-            <a:r>
-              <a:rPr lang="pt-BR" altLang="pt-BR" sz="1300" dirty="0" err="1">
-                <a:latin typeface="Calibri" panose="020F0502020204030204" pitchFamily="34" charset="0"/>
-              </a:rPr>
-              <a:t>Xxxxxxxxxxxxxxxxx</a:t>
-            </a:r>
-            <a:endParaRPr lang="pt-BR" altLang="pt-BR" sz="1300" dirty="0">
-              <a:latin typeface="Calibri" panose="020F0502020204030204" pitchFamily="34" charset="0"/>
-            </a:endParaRPr>
-          </a:p>
-          <a:p>
-            <a:pPr algn="just" eaLnBrk="1" hangingPunct="1"/>
-            <a:r>
-              <a:rPr lang="pt-BR" altLang="pt-BR" sz="1300" dirty="0">
-                <a:latin typeface="Calibri" panose="020F0502020204030204" pitchFamily="34" charset="0"/>
-              </a:rPr>
-              <a:t>X</a:t>
-            </a:r>
-          </a:p>
-          <a:p>
-            <a:pPr algn="just" eaLnBrk="1" hangingPunct="1"/>
-            <a:r>
-              <a:rPr lang="pt-BR" altLang="pt-BR" sz="1300" dirty="0">
-                <a:latin typeface="Calibri" panose="020F0502020204030204" pitchFamily="34" charset="0"/>
-              </a:rPr>
-              <a:t>X</a:t>
-            </a:r>
-          </a:p>
-          <a:p>
-            <a:pPr algn="just" eaLnBrk="1" hangingPunct="1"/>
-            <a:r>
-              <a:rPr lang="pt-BR" altLang="pt-BR" sz="1300" dirty="0">
-                <a:latin typeface="Calibri" panose="020F0502020204030204" pitchFamily="34" charset="0"/>
-              </a:rPr>
-              <a:t>X</a:t>
-            </a:r>
-          </a:p>
-          <a:p>
-            <a:pPr algn="just" eaLnBrk="1" hangingPunct="1"/>
-            <a:r>
-              <a:rPr lang="pt-BR" altLang="pt-BR" sz="1300" dirty="0">
-                <a:latin typeface="Calibri" panose="020F0502020204030204" pitchFamily="34" charset="0"/>
-              </a:rPr>
-              <a:t>X</a:t>
-            </a:r>
-          </a:p>
-          <a:p>
-            <a:pPr algn="just" eaLnBrk="1" hangingPunct="1"/>
-            <a:r>
-              <a:rPr lang="pt-BR" altLang="pt-BR" sz="1300" b="1" dirty="0">
-                <a:solidFill>
-                  <a:srgbClr val="FF0000"/>
-                </a:solidFill>
-                <a:latin typeface="Calibri" panose="020F0502020204030204" pitchFamily="34" charset="0"/>
-              </a:rPr>
-              <a:t>TAMANHO POSTER:  75 cm (largura)  X 120  cm (altura)</a:t>
-            </a:r>
-          </a:p>
-          <a:p>
-            <a:pPr algn="just" eaLnBrk="1" hangingPunct="1"/>
-            <a:r>
-              <a:rPr lang="pt-BR" altLang="pt-BR" sz="1300" dirty="0">
-                <a:latin typeface="Calibri" panose="020F0502020204030204" pitchFamily="34" charset="0"/>
-              </a:rPr>
-              <a:t>X</a:t>
-            </a:r>
-          </a:p>
-          <a:p>
-            <a:pPr algn="just" eaLnBrk="1" hangingPunct="1"/>
-            <a:r>
-              <a:rPr lang="pt-BR" altLang="pt-BR" sz="1300" dirty="0">
-                <a:latin typeface="Calibri" panose="020F0502020204030204" pitchFamily="34" charset="0"/>
-              </a:rPr>
-              <a:t>X</a:t>
-            </a:r>
-          </a:p>
-          <a:p>
-            <a:pPr algn="just" eaLnBrk="1" hangingPunct="1"/>
-            <a:r>
-              <a:rPr lang="pt-BR" altLang="pt-BR" sz="1300" dirty="0">
-                <a:latin typeface="Calibri" panose="020F0502020204030204" pitchFamily="34" charset="0"/>
-              </a:rPr>
-              <a:t>X</a:t>
-            </a:r>
-          </a:p>
-          <a:p>
-            <a:pPr algn="just" eaLnBrk="1" hangingPunct="1"/>
-            <a:r>
-              <a:rPr lang="pt-BR" altLang="pt-BR" sz="1300" dirty="0">
-                <a:latin typeface="Calibri" panose="020F0502020204030204" pitchFamily="34" charset="0"/>
-              </a:rPr>
-              <a:t>X</a:t>
-            </a:r>
-          </a:p>
-          <a:p>
-            <a:pPr algn="just" eaLnBrk="1" hangingPunct="1"/>
-            <a:r>
-              <a:rPr lang="pt-BR" altLang="pt-BR" sz="1300" dirty="0">
-                <a:latin typeface="Calibri" panose="020F0502020204030204" pitchFamily="34" charset="0"/>
-              </a:rPr>
-              <a:t>X</a:t>
-            </a:r>
-          </a:p>
-          <a:p>
-            <a:pPr algn="just" eaLnBrk="1" hangingPunct="1"/>
-            <a:r>
-              <a:rPr lang="pt-BR" altLang="pt-BR" sz="1300" dirty="0">
-                <a:latin typeface="Calibri" panose="020F0502020204030204" pitchFamily="34" charset="0"/>
-              </a:rPr>
-              <a:t>X</a:t>
-            </a:r>
-          </a:p>
-          <a:p>
-            <a:pPr algn="just" eaLnBrk="1" hangingPunct="1"/>
-            <a:r>
-              <a:rPr lang="pt-BR" altLang="pt-BR" sz="1300" dirty="0">
-                <a:latin typeface="Calibri" panose="020F0502020204030204" pitchFamily="34" charset="0"/>
-              </a:rPr>
-              <a:t>X</a:t>
-            </a:r>
-          </a:p>
-          <a:p>
-            <a:pPr algn="just" eaLnBrk="1" hangingPunct="1"/>
-            <a:r>
-              <a:rPr lang="pt-BR" altLang="pt-BR" sz="1300" dirty="0">
-                <a:latin typeface="Calibri" panose="020F0502020204030204" pitchFamily="34" charset="0"/>
-              </a:rPr>
-              <a:t>x</a:t>
+            <a:pPr algn="just"/>
+            <a:r>
+              <a:rPr lang="pt-BR" sz="1300" dirty="0">
+                <a:latin typeface="+mj-lt"/>
+              </a:rPr>
+              <a:t>Há uma série de ferramentas que têm como propósito tornar o conhecimento sistemático computável. Alguns </a:t>
+            </a:r>
+            <a:r>
+              <a:rPr lang="pt-BR" sz="1300" i="1" dirty="0">
+                <a:latin typeface="+mj-lt"/>
+              </a:rPr>
+              <a:t>softwares</a:t>
+            </a:r>
+            <a:r>
+              <a:rPr lang="pt-BR" sz="1300" dirty="0">
+                <a:latin typeface="+mj-lt"/>
+              </a:rPr>
+              <a:t> são mais voltados para conhecimento algébrico, como o </a:t>
+            </a:r>
+            <a:r>
+              <a:rPr lang="pt-BR" sz="1300" i="1" dirty="0">
+                <a:latin typeface="+mj-lt"/>
+              </a:rPr>
+              <a:t>Derive</a:t>
+            </a:r>
+            <a:r>
+              <a:rPr lang="pt-BR" sz="1300" dirty="0">
+                <a:latin typeface="+mj-lt"/>
+              </a:rPr>
+              <a:t> ou </a:t>
+            </a:r>
+            <a:r>
+              <a:rPr lang="pt-BR" sz="1300" i="1" dirty="0">
+                <a:latin typeface="+mj-lt"/>
+              </a:rPr>
+              <a:t>TI-</a:t>
+            </a:r>
+            <a:r>
+              <a:rPr lang="pt-BR" sz="1300" i="1" dirty="0" err="1">
+                <a:latin typeface="+mj-lt"/>
+              </a:rPr>
+              <a:t>Nspire</a:t>
+            </a:r>
+            <a:r>
+              <a:rPr lang="pt-BR" sz="1300" i="1" dirty="0">
+                <a:latin typeface="+mj-lt"/>
+              </a:rPr>
+              <a:t> da Texas </a:t>
+            </a:r>
+            <a:r>
+              <a:rPr lang="pt-BR" sz="1300" i="1" dirty="0" err="1">
+                <a:latin typeface="+mj-lt"/>
+              </a:rPr>
+              <a:t>Instruments</a:t>
+            </a:r>
+            <a:r>
+              <a:rPr lang="pt-BR" sz="1300" dirty="0">
+                <a:latin typeface="+mj-lt"/>
+              </a:rPr>
+              <a:t>, outros vão além, tentando tornar acessível todo o conhecimento sistemático computável fornecendo respostas para consultas factuais, como o </a:t>
+            </a:r>
+            <a:r>
+              <a:rPr lang="pt-BR" sz="1300" i="1" dirty="0" err="1">
+                <a:latin typeface="+mj-lt"/>
+              </a:rPr>
+              <a:t>Wolframalpha</a:t>
+            </a:r>
+            <a:r>
+              <a:rPr lang="pt-BR" sz="1300" dirty="0">
+                <a:latin typeface="+mj-lt"/>
+              </a:rPr>
+              <a:t>. Devido ao caráter complexo dessas ferramentas, muitas são pagas, ou os recursos oferecidos são extremamente limitados. Outro problema dessas ferramentas está no suporte, seja por questões de internacionalização ou pela descontinuidade da ferramenta. Além disso, os algoritmos usados dessas ferramentas não está disponível para reconhecimento.</a:t>
             </a:r>
           </a:p>
         </p:txBody>
@@ -5035,9 +4928,7 @@
             <a:avLst/>
           </a:prstGeom>
           <a:solidFill>
-            <a:schemeClr val="bg2">
-              <a:lumMod val="50000"/>
-            </a:schemeClr>
+            <a:srgbClr val="717FB3"/>
           </a:solidFill>
           <a:ln>
             <a:solidFill>
@@ -5238,95 +5129,20 @@
               <a:rPr lang="pt-BR" altLang="pt-BR" sz="1300" dirty="0">
                 <a:latin typeface="Calibri" panose="020F0502020204030204" pitchFamily="34" charset="0"/>
               </a:rPr>
-              <a:t>Esse trabalho tem como objetivo x</a:t>
-            </a:r>
-          </a:p>
-          <a:p>
-            <a:pPr algn="just" eaLnBrk="1" hangingPunct="1"/>
+              <a:t>Este trabalho tem como objetivo desenvolver um software de conhecimento computacional matemático de código aberto, cujo objetivo principal é analisar, interpretar, simplificar e resolver de forma iterativa expressões algébricas com base em heurísticas simples, utilizando para isso conceitos das disciplinas de exatas do curso de Ciência da Computação, uma vez que as ferramentas disponíveis são proprietárias. O software fornece uma forma simples de se estendê-lo utilizando linguagens embarcadas, não sendo necessária a </a:t>
+            </a:r>
+            <a:r>
+              <a:rPr lang="pt-BR" altLang="pt-BR" sz="1300" dirty="0" err="1">
+                <a:latin typeface="Calibri" panose="020F0502020204030204" pitchFamily="34" charset="0"/>
+              </a:rPr>
+              <a:t>recompilação</a:t>
+            </a:r>
             <a:r>
               <a:rPr lang="pt-BR" altLang="pt-BR" sz="1300" dirty="0">
                 <a:latin typeface="Calibri" panose="020F0502020204030204" pitchFamily="34" charset="0"/>
               </a:rPr>
-              <a:t>X</a:t>
-            </a:r>
-          </a:p>
-          <a:p>
-            <a:pPr algn="just" eaLnBrk="1" hangingPunct="1"/>
-            <a:r>
-              <a:rPr lang="pt-BR" altLang="pt-BR" sz="1300" dirty="0">
-                <a:latin typeface="Calibri" panose="020F0502020204030204" pitchFamily="34" charset="0"/>
-              </a:rPr>
-              <a:t>X</a:t>
-            </a:r>
-          </a:p>
-          <a:p>
-            <a:pPr algn="just" eaLnBrk="1" hangingPunct="1"/>
-            <a:r>
-              <a:rPr lang="pt-BR" altLang="pt-BR" sz="1300" dirty="0">
-                <a:latin typeface="Calibri" panose="020F0502020204030204" pitchFamily="34" charset="0"/>
-              </a:rPr>
-              <a:t>X</a:t>
-            </a:r>
-          </a:p>
-          <a:p>
-            <a:pPr algn="just" eaLnBrk="1" hangingPunct="1"/>
-            <a:r>
-              <a:rPr lang="pt-BR" altLang="pt-BR" sz="1300" dirty="0">
-                <a:latin typeface="Calibri" panose="020F0502020204030204" pitchFamily="34" charset="0"/>
-              </a:rPr>
-              <a:t>X</a:t>
-            </a:r>
-          </a:p>
-          <a:p>
-            <a:pPr algn="just" eaLnBrk="1" hangingPunct="1"/>
-            <a:r>
-              <a:rPr lang="pt-BR" altLang="pt-BR" sz="1300" dirty="0">
-                <a:latin typeface="Calibri" panose="020F0502020204030204" pitchFamily="34" charset="0"/>
-              </a:rPr>
-              <a:t>X</a:t>
-            </a:r>
-          </a:p>
-          <a:p>
-            <a:pPr algn="just" eaLnBrk="1" hangingPunct="1"/>
-            <a:r>
-              <a:rPr lang="pt-BR" altLang="pt-BR" sz="1300" dirty="0">
-                <a:latin typeface="Calibri" panose="020F0502020204030204" pitchFamily="34" charset="0"/>
-              </a:rPr>
-              <a:t>X</a:t>
-            </a:r>
-          </a:p>
-          <a:p>
-            <a:pPr algn="just" eaLnBrk="1" hangingPunct="1"/>
-            <a:r>
-              <a:rPr lang="pt-BR" altLang="pt-BR" sz="1300" dirty="0">
-                <a:latin typeface="Calibri" panose="020F0502020204030204" pitchFamily="34" charset="0"/>
-              </a:rPr>
-              <a:t>X</a:t>
-            </a:r>
-          </a:p>
-          <a:p>
-            <a:pPr algn="just" eaLnBrk="1" hangingPunct="1"/>
-            <a:r>
-              <a:rPr lang="pt-BR" altLang="pt-BR" sz="1300" dirty="0">
-                <a:latin typeface="Calibri" panose="020F0502020204030204" pitchFamily="34" charset="0"/>
-              </a:rPr>
-              <a:t>X</a:t>
-            </a:r>
-          </a:p>
-          <a:p>
-            <a:pPr algn="just" eaLnBrk="1" hangingPunct="1"/>
-            <a:r>
-              <a:rPr lang="pt-BR" altLang="pt-BR" sz="1300" dirty="0">
-                <a:latin typeface="Calibri" panose="020F0502020204030204" pitchFamily="34" charset="0"/>
-              </a:rPr>
-              <a:t>X</a:t>
-            </a:r>
-          </a:p>
-          <a:p>
-            <a:pPr algn="just" eaLnBrk="1" hangingPunct="1"/>
-            <a:endParaRPr lang="pt-BR" altLang="pt-BR" sz="1300" dirty="0">
-              <a:latin typeface="Calibri" panose="020F0502020204030204" pitchFamily="34" charset="0"/>
-            </a:endParaRPr>
+              <a:t> do código fonte do projeto.</a:t>
+            </a:r>
           </a:p>
         </p:txBody>
       </p:sp>
@@ -5345,9 +5161,7 @@
             <a:avLst/>
           </a:prstGeom>
           <a:solidFill>
-            <a:schemeClr val="bg2">
-              <a:lumMod val="50000"/>
-            </a:schemeClr>
+            <a:srgbClr val="717FB3"/>
           </a:solidFill>
           <a:ln>
             <a:solidFill>
@@ -5548,125 +5362,122 @@
               <a:rPr lang="pt-BR" altLang="pt-BR" sz="1300" dirty="0">
                 <a:latin typeface="Calibri" panose="020F0502020204030204" pitchFamily="34" charset="0"/>
               </a:rPr>
-              <a:t>A metodologia utilizada é </a:t>
+              <a:t>Para o desenvolvimento do software, foi utilizada a plataforma Java, cuja estrutura foi definida como um </a:t>
+            </a:r>
+            <a:r>
+              <a:rPr lang="pt-BR" altLang="pt-BR" sz="1300" dirty="0" err="1">
+                <a:latin typeface="Calibri" panose="020F0502020204030204" pitchFamily="34" charset="0"/>
+              </a:rPr>
+              <a:t>multiprojeto</a:t>
+            </a:r>
+            <a:r>
+              <a:rPr lang="pt-BR" altLang="pt-BR" sz="1300" dirty="0">
+                <a:latin typeface="Calibri" panose="020F0502020204030204" pitchFamily="34" charset="0"/>
+              </a:rPr>
+              <a:t> do Gradle/Maven. Tendo como base o design tático e estratégico do Domain Driven Design, Test Driven Development, Padrões de Projetos (como </a:t>
+            </a:r>
+            <a:r>
+              <a:rPr lang="pt-BR" altLang="pt-BR" sz="1300" dirty="0" err="1">
+                <a:latin typeface="Calibri" panose="020F0502020204030204" pitchFamily="34" charset="0"/>
+              </a:rPr>
+              <a:t>Inversion</a:t>
+            </a:r>
+            <a:r>
+              <a:rPr lang="pt-BR" altLang="pt-BR" sz="1300" dirty="0">
+                <a:latin typeface="Calibri" panose="020F0502020204030204" pitchFamily="34" charset="0"/>
+              </a:rPr>
+              <a:t> </a:t>
+            </a:r>
+            <a:r>
+              <a:rPr lang="pt-BR" altLang="pt-BR" sz="1300" dirty="0" err="1">
+                <a:latin typeface="Calibri" panose="020F0502020204030204" pitchFamily="34" charset="0"/>
+              </a:rPr>
+              <a:t>of</a:t>
+            </a:r>
+            <a:r>
+              <a:rPr lang="pt-BR" altLang="pt-BR" sz="1300" dirty="0">
+                <a:latin typeface="Calibri" panose="020F0502020204030204" pitchFamily="34" charset="0"/>
+              </a:rPr>
+              <a:t> </a:t>
+            </a:r>
+            <a:r>
+              <a:rPr lang="pt-BR" altLang="pt-BR" sz="1300" dirty="0" err="1">
+                <a:latin typeface="Calibri" panose="020F0502020204030204" pitchFamily="34" charset="0"/>
+              </a:rPr>
+              <a:t>Control</a:t>
+            </a:r>
+            <a:r>
+              <a:rPr lang="pt-BR" altLang="pt-BR" sz="1300" dirty="0">
+                <a:latin typeface="Calibri" panose="020F0502020204030204" pitchFamily="34" charset="0"/>
+              </a:rPr>
+              <a:t>, Composite, Visitor e </a:t>
+            </a:r>
+            <a:r>
+              <a:rPr lang="pt-BR" altLang="pt-BR" sz="1300" dirty="0" err="1">
+                <a:latin typeface="Calibri" panose="020F0502020204030204" pitchFamily="34" charset="0"/>
+              </a:rPr>
+              <a:t>Model-View-Controller</a:t>
+            </a:r>
+            <a:r>
+              <a:rPr lang="pt-BR" altLang="pt-BR" sz="1300" dirty="0">
+                <a:latin typeface="Calibri" panose="020F0502020204030204" pitchFamily="34" charset="0"/>
+              </a:rPr>
+              <a:t>) e teorias de compilação, o projeto foi dividido em dois módulos: </a:t>
+            </a:r>
+            <a:r>
+              <a:rPr lang="pt-BR" altLang="pt-BR" sz="1300" i="1" dirty="0">
+                <a:latin typeface="Calibri" panose="020F0502020204030204" pitchFamily="34" charset="0"/>
+              </a:rPr>
+              <a:t>core</a:t>
+            </a:r>
+            <a:r>
+              <a:rPr lang="pt-BR" altLang="pt-BR" sz="1300" dirty="0">
+                <a:latin typeface="Calibri" panose="020F0502020204030204" pitchFamily="34" charset="0"/>
+              </a:rPr>
+              <a:t> (que contêm o domínio da aplicação), onde foram definidas a gramática do ANTLR para análise de expressões e os pacotes com as classes que compõe o núcleo do software; e </a:t>
+            </a:r>
+            <a:r>
+              <a:rPr lang="pt-BR" altLang="pt-BR" sz="1300" i="1" dirty="0">
+                <a:latin typeface="Calibri" panose="020F0502020204030204" pitchFamily="34" charset="0"/>
+              </a:rPr>
+              <a:t>web</a:t>
+            </a:r>
+            <a:r>
+              <a:rPr lang="pt-BR" altLang="pt-BR" sz="1300" dirty="0">
+                <a:latin typeface="Calibri" panose="020F0502020204030204" pitchFamily="34" charset="0"/>
+              </a:rPr>
+              <a:t> (implementação web da interface do usuário utilizando o </a:t>
+            </a:r>
+            <a:r>
+              <a:rPr lang="pt-BR" altLang="pt-BR" sz="1300" dirty="0" err="1">
+                <a:latin typeface="Calibri" panose="020F0502020204030204" pitchFamily="34" charset="0"/>
+              </a:rPr>
+              <a:t>SpringBoot</a:t>
+            </a:r>
+            <a:r>
+              <a:rPr lang="pt-BR" altLang="pt-BR" sz="1300" dirty="0">
+                <a:latin typeface="Calibri" panose="020F0502020204030204" pitchFamily="34" charset="0"/>
+              </a:rPr>
+              <a:t> para o gerenciamento das heurísticas que serão armazenadas em banco de dados, e que serão carregadas e interpretadas em tempo de execução por conta da interoperabilidade entre as linguagens Java e </a:t>
+            </a:r>
+            <a:r>
+              <a:rPr lang="pt-BR" altLang="pt-BR" sz="1300" dirty="0" err="1">
+                <a:latin typeface="Calibri" panose="020F0502020204030204" pitchFamily="34" charset="0"/>
+              </a:rPr>
+              <a:t>Groovy</a:t>
+            </a:r>
+            <a:r>
+              <a:rPr lang="pt-BR" altLang="pt-BR" sz="1300" dirty="0">
+                <a:latin typeface="Calibri" panose="020F0502020204030204" pitchFamily="34" charset="0"/>
+              </a:rPr>
+              <a:t>).</a:t>
             </a:r>
           </a:p>
           <a:p>
             <a:pPr algn="just" eaLnBrk="1" hangingPunct="1"/>
-            <a:r>
-              <a:rPr lang="pt-BR" altLang="pt-BR" sz="1300" dirty="0">
-                <a:latin typeface="Calibri" panose="020F0502020204030204" pitchFamily="34" charset="0"/>
-              </a:rPr>
-              <a:t>X</a:t>
-            </a:r>
-          </a:p>
-          <a:p>
-            <a:pPr algn="just" eaLnBrk="1" hangingPunct="1"/>
-            <a:r>
-              <a:rPr lang="pt-BR" altLang="pt-BR" sz="1300" dirty="0">
-                <a:latin typeface="Calibri" panose="020F0502020204030204" pitchFamily="34" charset="0"/>
-              </a:rPr>
-              <a:t>X</a:t>
-            </a:r>
-          </a:p>
-          <a:p>
-            <a:pPr algn="just" eaLnBrk="1" hangingPunct="1"/>
-            <a:r>
-              <a:rPr lang="pt-BR" altLang="pt-BR" sz="1300" dirty="0">
-                <a:latin typeface="Calibri" panose="020F0502020204030204" pitchFamily="34" charset="0"/>
-              </a:rPr>
-              <a:t>X</a:t>
-            </a:r>
-          </a:p>
-          <a:p>
-            <a:pPr algn="just" eaLnBrk="1" hangingPunct="1"/>
-            <a:r>
-              <a:rPr lang="pt-BR" altLang="pt-BR" sz="1300" dirty="0">
-                <a:latin typeface="Calibri" panose="020F0502020204030204" pitchFamily="34" charset="0"/>
-              </a:rPr>
-              <a:t>X</a:t>
-            </a:r>
-          </a:p>
-          <a:p>
-            <a:pPr algn="just" eaLnBrk="1" hangingPunct="1"/>
-            <a:r>
-              <a:rPr lang="pt-BR" altLang="pt-BR" sz="1300" dirty="0">
-                <a:latin typeface="Calibri" panose="020F0502020204030204" pitchFamily="34" charset="0"/>
-              </a:rPr>
-              <a:t>X</a:t>
-            </a:r>
-          </a:p>
-          <a:p>
-            <a:pPr algn="just" eaLnBrk="1" hangingPunct="1"/>
-            <a:r>
-              <a:rPr lang="pt-BR" altLang="pt-BR" sz="1300" dirty="0">
-                <a:latin typeface="Calibri" panose="020F0502020204030204" pitchFamily="34" charset="0"/>
-              </a:rPr>
-              <a:t>X</a:t>
-            </a:r>
-          </a:p>
-          <a:p>
-            <a:pPr algn="just" eaLnBrk="1" hangingPunct="1"/>
-            <a:r>
-              <a:rPr lang="pt-BR" altLang="pt-BR" sz="1300" dirty="0">
-                <a:latin typeface="Calibri" panose="020F0502020204030204" pitchFamily="34" charset="0"/>
-              </a:rPr>
-              <a:t>X</a:t>
-            </a:r>
-          </a:p>
-          <a:p>
-            <a:pPr algn="just" eaLnBrk="1" hangingPunct="1"/>
-            <a:r>
-              <a:rPr lang="pt-BR" altLang="pt-BR" sz="1300" dirty="0">
-                <a:latin typeface="Calibri" panose="020F0502020204030204" pitchFamily="34" charset="0"/>
-              </a:rPr>
-              <a:t>X</a:t>
-            </a:r>
-          </a:p>
-          <a:p>
-            <a:pPr algn="just" eaLnBrk="1" hangingPunct="1"/>
-            <a:r>
-              <a:rPr lang="pt-BR" altLang="pt-BR" sz="1300" dirty="0">
-                <a:latin typeface="Calibri" panose="020F0502020204030204" pitchFamily="34" charset="0"/>
-              </a:rPr>
-              <a:t>X</a:t>
-            </a:r>
-          </a:p>
-          <a:p>
-            <a:pPr algn="just" eaLnBrk="1" hangingPunct="1"/>
-            <a:r>
-              <a:rPr lang="pt-BR" altLang="pt-BR" sz="1300" dirty="0">
-                <a:latin typeface="Calibri" panose="020F0502020204030204" pitchFamily="34" charset="0"/>
-              </a:rPr>
-              <a:t>X</a:t>
-            </a:r>
-          </a:p>
-          <a:p>
-            <a:pPr algn="just" eaLnBrk="1" hangingPunct="1"/>
-            <a:r>
-              <a:rPr lang="pt-BR" altLang="pt-BR" sz="1300" dirty="0">
-                <a:latin typeface="Calibri" panose="020F0502020204030204" pitchFamily="34" charset="0"/>
-              </a:rPr>
-              <a:t>X</a:t>
-            </a:r>
-          </a:p>
-          <a:p>
-            <a:pPr algn="just" eaLnBrk="1" hangingPunct="1"/>
-            <a:r>
-              <a:rPr lang="pt-BR" altLang="pt-BR" sz="1300" dirty="0">
-                <a:latin typeface="Calibri" panose="020F0502020204030204" pitchFamily="34" charset="0"/>
-              </a:rPr>
-              <a:t>X</a:t>
-            </a:r>
-          </a:p>
-          <a:p>
-            <a:pPr algn="just" eaLnBrk="1" hangingPunct="1"/>
-            <a:r>
-              <a:rPr lang="pt-BR" altLang="pt-BR" sz="1300" dirty="0">
-                <a:latin typeface="Calibri" panose="020F0502020204030204" pitchFamily="34" charset="0"/>
-              </a:rPr>
-              <a:t>x</a:t>
-            </a:r>
+            <a:endParaRPr lang="pt-BR" altLang="pt-BR" sz="1300" dirty="0">
+              <a:latin typeface="Calibri" panose="020F0502020204030204" pitchFamily="34" charset="0"/>
+            </a:endParaRPr>
           </a:p>
         </p:txBody>
       </p:sp>
@@ -5685,9 +5496,7 @@
             <a:avLst/>
           </a:prstGeom>
           <a:solidFill>
-            <a:schemeClr val="bg2">
-              <a:lumMod val="50000"/>
-            </a:schemeClr>
+            <a:srgbClr val="717FB3"/>
           </a:solidFill>
           <a:ln>
             <a:solidFill>
@@ -5759,14 +5568,17 @@
         <p:spPr bwMode="auto">
           <a:xfrm>
             <a:off x="5307013" y="2994025"/>
-            <a:ext cx="4056062" cy="2827338"/>
+            <a:ext cx="4056062" cy="1613168"/>
           </a:xfrm>
           <a:prstGeom prst="rect">
             <a:avLst/>
           </a:prstGeom>
           <a:noFill/>
-          <a:ln>
+          <a:ln w="9525">
             <a:noFill/>
+            <a:miter lim="800000"/>
+            <a:headEnd/>
+            <a:tailEnd/>
           </a:ln>
           <a:extLst>
             <a:ext uri="{909E8E84-426E-40DD-AFC4-6F175D3DCCD1}">
@@ -5775,16 +5587,6 @@
                   <a:srgbClr val="FFFFFF"/>
                 </a:solidFill>
               </a14:hiddenFill>
-            </a:ext>
-            <a:ext uri="{91240B29-F687-4F45-9708-019B960494DF}">
-              <a14:hiddenLine xmlns:a14="http://schemas.microsoft.com/office/drawing/2010/main" w="9525">
-                <a:solidFill>
-                  <a:srgbClr val="000000"/>
-                </a:solidFill>
-                <a:miter lim="800000"/>
-                <a:headEnd/>
-                <a:tailEnd/>
-              </a14:hiddenLine>
             </a:ext>
           </a:extLst>
         </p:spPr>
@@ -5894,344 +5696,8 @@
               <a:rPr lang="pt-BR" altLang="pt-BR" sz="1300" dirty="0">
                 <a:latin typeface="Calibri" panose="020F0502020204030204" pitchFamily="34" charset="0"/>
               </a:rPr>
-              <a:t>X</a:t>
-            </a:r>
-          </a:p>
-          <a:p>
-            <a:pPr algn="just" eaLnBrk="1" hangingPunct="1"/>
-            <a:r>
-              <a:rPr lang="pt-BR" altLang="pt-BR" sz="1300" dirty="0">
-                <a:latin typeface="Calibri" panose="020F0502020204030204" pitchFamily="34" charset="0"/>
-              </a:rPr>
-              <a:t>X</a:t>
-            </a:r>
-          </a:p>
-          <a:p>
-            <a:pPr algn="just" eaLnBrk="1" hangingPunct="1"/>
-            <a:r>
-              <a:rPr lang="pt-BR" altLang="pt-BR" sz="1300" dirty="0">
-                <a:latin typeface="Calibri" panose="020F0502020204030204" pitchFamily="34" charset="0"/>
-              </a:rPr>
-              <a:t>X</a:t>
-            </a:r>
-          </a:p>
-          <a:p>
-            <a:pPr algn="just" eaLnBrk="1" hangingPunct="1"/>
-            <a:r>
-              <a:rPr lang="pt-BR" altLang="pt-BR" sz="1300" dirty="0">
-                <a:latin typeface="Calibri" panose="020F0502020204030204" pitchFamily="34" charset="0"/>
-              </a:rPr>
-              <a:t>X</a:t>
-            </a:r>
-          </a:p>
-          <a:p>
-            <a:pPr algn="just" eaLnBrk="1" hangingPunct="1"/>
-            <a:r>
-              <a:rPr lang="pt-BR" altLang="pt-BR" sz="1300" dirty="0">
-                <a:latin typeface="Calibri" panose="020F0502020204030204" pitchFamily="34" charset="0"/>
-              </a:rPr>
-              <a:t>X</a:t>
-            </a:r>
-          </a:p>
-          <a:p>
-            <a:pPr algn="just" eaLnBrk="1" hangingPunct="1"/>
-            <a:r>
-              <a:rPr lang="pt-BR" altLang="pt-BR" sz="1300" dirty="0">
-                <a:latin typeface="Calibri" panose="020F0502020204030204" pitchFamily="34" charset="0"/>
-              </a:rPr>
-              <a:t>X</a:t>
-            </a:r>
-          </a:p>
-          <a:p>
-            <a:pPr algn="just" eaLnBrk="1" hangingPunct="1"/>
-            <a:r>
-              <a:rPr lang="pt-BR" altLang="pt-BR" sz="1300" dirty="0">
-                <a:latin typeface="Calibri" panose="020F0502020204030204" pitchFamily="34" charset="0"/>
-              </a:rPr>
-              <a:t>X</a:t>
-            </a:r>
-          </a:p>
-          <a:p>
-            <a:pPr algn="just" eaLnBrk="1" hangingPunct="1"/>
-            <a:r>
-              <a:rPr lang="pt-BR" altLang="pt-BR" sz="1300" dirty="0">
-                <a:latin typeface="Calibri" panose="020F0502020204030204" pitchFamily="34" charset="0"/>
-              </a:rPr>
-              <a:t>X</a:t>
-            </a:r>
-          </a:p>
-          <a:p>
-            <a:pPr algn="just" eaLnBrk="1" hangingPunct="1"/>
-            <a:r>
-              <a:rPr lang="pt-BR" altLang="pt-BR" sz="1300" dirty="0">
-                <a:latin typeface="Calibri" panose="020F0502020204030204" pitchFamily="34" charset="0"/>
-              </a:rPr>
-              <a:t>X</a:t>
-            </a:r>
-          </a:p>
-          <a:p>
-            <a:pPr algn="just" eaLnBrk="1" hangingPunct="1"/>
-            <a:r>
-              <a:rPr lang="pt-BR" altLang="pt-BR" sz="1300" dirty="0">
-                <a:latin typeface="Calibri" panose="020F0502020204030204" pitchFamily="34" charset="0"/>
-              </a:rPr>
-              <a:t>X</a:t>
-            </a:r>
-          </a:p>
-          <a:p>
-            <a:pPr algn="just" eaLnBrk="1" hangingPunct="1"/>
-            <a:r>
-              <a:rPr lang="pt-BR" altLang="pt-BR" sz="1300" dirty="0">
-                <a:latin typeface="Calibri" panose="020F0502020204030204" pitchFamily="34" charset="0"/>
-              </a:rPr>
-              <a:t>X</a:t>
-            </a:r>
-          </a:p>
-          <a:p>
-            <a:pPr algn="just" eaLnBrk="1" hangingPunct="1"/>
-            <a:r>
-              <a:rPr lang="pt-BR" altLang="pt-BR" sz="1300" dirty="0">
-                <a:latin typeface="Calibri" panose="020F0502020204030204" pitchFamily="34" charset="0"/>
-              </a:rPr>
-              <a:t>X</a:t>
-            </a:r>
-          </a:p>
-          <a:p>
-            <a:pPr algn="just" eaLnBrk="1" hangingPunct="1"/>
-            <a:r>
-              <a:rPr lang="pt-BR" altLang="pt-BR" sz="1300" dirty="0">
-                <a:latin typeface="Calibri" panose="020F0502020204030204" pitchFamily="34" charset="0"/>
-              </a:rPr>
-              <a:t>X</a:t>
-            </a:r>
-          </a:p>
-          <a:p>
-            <a:pPr algn="just" eaLnBrk="1" hangingPunct="1"/>
-            <a:r>
-              <a:rPr lang="pt-BR" altLang="pt-BR" sz="1300" dirty="0">
-                <a:latin typeface="Calibri" panose="020F0502020204030204" pitchFamily="34" charset="0"/>
-              </a:rPr>
-              <a:t>x.</a:t>
-            </a:r>
-          </a:p>
-        </p:txBody>
-      </p:sp>
-      <p:sp>
-        <p:nvSpPr>
-          <p:cNvPr id="2069" name="CaixaDeTexto 15"/>
-          <p:cNvSpPr txBox="1">
-            <a:spLocks noChangeArrowheads="1"/>
-          </p:cNvSpPr>
-          <p:nvPr/>
-        </p:nvSpPr>
-        <p:spPr bwMode="auto">
-          <a:xfrm>
-            <a:off x="5305425" y="5829300"/>
-            <a:ext cx="4057419" cy="2234397"/>
-          </a:xfrm>
-          <a:prstGeom prst="rect">
-            <a:avLst/>
-          </a:prstGeom>
-          <a:solidFill>
-            <a:schemeClr val="bg1">
-              <a:lumMod val="85000"/>
-            </a:schemeClr>
-          </a:solidFill>
-          <a:ln>
-            <a:noFill/>
-          </a:ln>
-        </p:spPr>
-        <p:txBody>
-          <a:bodyPr wrap="square" lIns="33467" tIns="16734" rIns="33467" bIns="16734">
-            <a:spAutoFit/>
-          </a:bodyPr>
-          <a:lstStyle>
-            <a:lvl1pPr eaLnBrk="0" hangingPunct="0">
-              <a:defRPr sz="2500">
-                <a:solidFill>
-                  <a:schemeClr val="tx1"/>
-                </a:solidFill>
-                <a:latin typeface="Arial" panose="020B0604020202020204" pitchFamily="34" charset="0"/>
-              </a:defRPr>
-            </a:lvl1pPr>
-            <a:lvl2pPr marL="742950" indent="-285750" eaLnBrk="0" hangingPunct="0">
-              <a:defRPr sz="2500">
-                <a:solidFill>
-                  <a:schemeClr val="tx1"/>
-                </a:solidFill>
-                <a:latin typeface="Arial" panose="020B0604020202020204" pitchFamily="34" charset="0"/>
-              </a:defRPr>
-            </a:lvl2pPr>
-            <a:lvl3pPr marL="1143000" indent="-228600" eaLnBrk="0" hangingPunct="0">
-              <a:defRPr sz="2500">
-                <a:solidFill>
-                  <a:schemeClr val="tx1"/>
-                </a:solidFill>
-                <a:latin typeface="Arial" panose="020B0604020202020204" pitchFamily="34" charset="0"/>
-              </a:defRPr>
-            </a:lvl3pPr>
-            <a:lvl4pPr marL="1600200" indent="-228600" eaLnBrk="0" hangingPunct="0">
-              <a:defRPr sz="2500">
-                <a:solidFill>
-                  <a:schemeClr val="tx1"/>
-                </a:solidFill>
-                <a:latin typeface="Arial" panose="020B0604020202020204" pitchFamily="34" charset="0"/>
-              </a:defRPr>
-            </a:lvl4pPr>
-            <a:lvl5pPr marL="2057400" indent="-228600" eaLnBrk="0" hangingPunct="0">
-              <a:defRPr sz="2500">
-                <a:solidFill>
-                  <a:schemeClr val="tx1"/>
-                </a:solidFill>
-                <a:latin typeface="Arial" panose="020B0604020202020204" pitchFamily="34" charset="0"/>
-              </a:defRPr>
-            </a:lvl5pPr>
-            <a:lvl6pPr marL="2514600" indent="-228600" defTabSz="1279525" eaLnBrk="0" fontAlgn="base" hangingPunct="0">
-              <a:spcBef>
-                <a:spcPct val="0"/>
-              </a:spcBef>
-              <a:spcAft>
-                <a:spcPct val="0"/>
-              </a:spcAft>
-              <a:defRPr sz="2500">
-                <a:solidFill>
-                  <a:schemeClr val="tx1"/>
-                </a:solidFill>
-                <a:latin typeface="Arial" panose="020B0604020202020204" pitchFamily="34" charset="0"/>
-              </a:defRPr>
-            </a:lvl6pPr>
-            <a:lvl7pPr marL="2971800" indent="-228600" defTabSz="1279525" eaLnBrk="0" fontAlgn="base" hangingPunct="0">
-              <a:spcBef>
-                <a:spcPct val="0"/>
-              </a:spcBef>
-              <a:spcAft>
-                <a:spcPct val="0"/>
-              </a:spcAft>
-              <a:defRPr sz="2500">
-                <a:solidFill>
-                  <a:schemeClr val="tx1"/>
-                </a:solidFill>
-                <a:latin typeface="Arial" panose="020B0604020202020204" pitchFamily="34" charset="0"/>
-              </a:defRPr>
-            </a:lvl7pPr>
-            <a:lvl8pPr marL="3429000" indent="-228600" defTabSz="1279525" eaLnBrk="0" fontAlgn="base" hangingPunct="0">
-              <a:spcBef>
-                <a:spcPct val="0"/>
-              </a:spcBef>
-              <a:spcAft>
-                <a:spcPct val="0"/>
-              </a:spcAft>
-              <a:defRPr sz="2500">
-                <a:solidFill>
-                  <a:schemeClr val="tx1"/>
-                </a:solidFill>
-                <a:latin typeface="Arial" panose="020B0604020202020204" pitchFamily="34" charset="0"/>
-              </a:defRPr>
-            </a:lvl8pPr>
-            <a:lvl9pPr marL="3886200" indent="-228600" defTabSz="1279525" eaLnBrk="0" fontAlgn="base" hangingPunct="0">
-              <a:spcBef>
-                <a:spcPct val="0"/>
-              </a:spcBef>
-              <a:spcAft>
-                <a:spcPct val="0"/>
-              </a:spcAft>
-              <a:defRPr sz="2500">
-                <a:solidFill>
-                  <a:schemeClr val="tx1"/>
-                </a:solidFill>
-                <a:latin typeface="Arial" panose="020B0604020202020204" pitchFamily="34" charset="0"/>
-              </a:defRPr>
-            </a:lvl9pPr>
-          </a:lstStyle>
-          <a:p>
-            <a:pPr algn="ctr" eaLnBrk="1" hangingPunct="1"/>
-            <a:endParaRPr lang="pt-BR" altLang="pt-BR" sz="1100" dirty="0">
-              <a:latin typeface="Calibri" panose="020F0502020204030204" pitchFamily="34" charset="0"/>
-            </a:endParaRPr>
-          </a:p>
-          <a:p>
-            <a:pPr algn="ctr" eaLnBrk="1" hangingPunct="1"/>
-            <a:endParaRPr lang="pt-BR" altLang="pt-BR" sz="1100" dirty="0">
-              <a:latin typeface="Calibri" panose="020F0502020204030204" pitchFamily="34" charset="0"/>
-            </a:endParaRPr>
-          </a:p>
-          <a:p>
-            <a:pPr algn="ctr" eaLnBrk="1" hangingPunct="1"/>
-            <a:endParaRPr lang="pt-BR" altLang="pt-BR" sz="1100" dirty="0">
-              <a:latin typeface="Calibri" panose="020F0502020204030204" pitchFamily="34" charset="0"/>
-            </a:endParaRPr>
-          </a:p>
-          <a:p>
-            <a:pPr algn="ctr" eaLnBrk="1" hangingPunct="1"/>
-            <a:endParaRPr lang="pt-BR" altLang="pt-BR" sz="1100" dirty="0">
-              <a:latin typeface="Calibri" panose="020F0502020204030204" pitchFamily="34" charset="0"/>
-            </a:endParaRPr>
-          </a:p>
-          <a:p>
-            <a:pPr algn="ctr" eaLnBrk="1" hangingPunct="1"/>
-            <a:endParaRPr lang="pt-BR" altLang="pt-BR" sz="1100" dirty="0">
-              <a:latin typeface="Calibri" panose="020F0502020204030204" pitchFamily="34" charset="0"/>
-            </a:endParaRPr>
-          </a:p>
-          <a:p>
-            <a:pPr algn="ctr" eaLnBrk="1" hangingPunct="1"/>
-            <a:endParaRPr lang="pt-BR" altLang="pt-BR" sz="1100" dirty="0">
-              <a:latin typeface="Calibri" panose="020F0502020204030204" pitchFamily="34" charset="0"/>
-            </a:endParaRPr>
-          </a:p>
-          <a:p>
-            <a:pPr algn="ctr" eaLnBrk="1" hangingPunct="1"/>
-            <a:endParaRPr lang="pt-BR" altLang="pt-BR" sz="1100" dirty="0">
-              <a:latin typeface="Calibri" panose="020F0502020204030204" pitchFamily="34" charset="0"/>
-            </a:endParaRPr>
-          </a:p>
-          <a:p>
-            <a:pPr algn="ctr" eaLnBrk="1" hangingPunct="1"/>
-            <a:endParaRPr lang="pt-BR" altLang="pt-BR" sz="1100" dirty="0">
-              <a:latin typeface="Calibri" panose="020F0502020204030204" pitchFamily="34" charset="0"/>
-            </a:endParaRPr>
-          </a:p>
-          <a:p>
-            <a:pPr algn="ctr" eaLnBrk="1" hangingPunct="1"/>
-            <a:endParaRPr lang="pt-BR" altLang="pt-BR" sz="1100" dirty="0">
-              <a:latin typeface="Calibri" panose="020F0502020204030204" pitchFamily="34" charset="0"/>
-            </a:endParaRPr>
-          </a:p>
-          <a:p>
-            <a:pPr algn="ctr" eaLnBrk="1" hangingPunct="1"/>
-            <a:endParaRPr lang="pt-BR" altLang="pt-BR" sz="1100" dirty="0">
-              <a:latin typeface="Calibri" panose="020F0502020204030204" pitchFamily="34" charset="0"/>
-            </a:endParaRPr>
-          </a:p>
-          <a:p>
-            <a:pPr algn="ctr" eaLnBrk="1" hangingPunct="1"/>
-            <a:endParaRPr lang="pt-BR" altLang="pt-BR" sz="1100" dirty="0">
-              <a:latin typeface="Calibri" panose="020F0502020204030204" pitchFamily="34" charset="0"/>
-            </a:endParaRPr>
-          </a:p>
-          <a:p>
-            <a:pPr algn="ctr" eaLnBrk="1" hangingPunct="1"/>
-            <a:endParaRPr lang="pt-BR" altLang="pt-BR" sz="1100" dirty="0">
-              <a:latin typeface="Calibri" panose="020F0502020204030204" pitchFamily="34" charset="0"/>
-            </a:endParaRPr>
-          </a:p>
-          <a:p>
-            <a:pPr algn="ctr" eaLnBrk="1" hangingPunct="1"/>
-            <a:r>
-              <a:rPr lang="pt-BR" altLang="pt-BR" sz="1100" dirty="0">
-                <a:latin typeface="Calibri" panose="020F0502020204030204" pitchFamily="34" charset="0"/>
-              </a:rPr>
-              <a:t>Figura. </a:t>
-            </a:r>
-            <a:r>
-              <a:rPr lang="pt-BR" altLang="pt-BR" sz="1100" dirty="0" err="1">
-                <a:latin typeface="Calibri" panose="020F0502020204030204" pitchFamily="34" charset="0"/>
-              </a:rPr>
-              <a:t>xxxxxxxx</a:t>
-            </a:r>
-            <a:endParaRPr lang="pt-BR" altLang="pt-BR" sz="1100" dirty="0">
-              <a:latin typeface="Calibri" panose="020F0502020204030204" pitchFamily="34" charset="0"/>
-            </a:endParaRPr>
+              <a:t>Como o princípio adotado para o desenvolvimento da aplicação foi o TDD, a maior parte dos problemas encontrados foram previamente resolvidos no decorrer do projeto utilizando-se testes automatizados. Além de testes automatizados, foram realizados testes para a validação da aplicação no cadastro e edição de heurísticas, bem como na simplificação e resolução de uma expressão algébrica extensa contendo diversos fatores (figura 1).</a:t>
+            </a:r>
           </a:p>
         </p:txBody>
       </p:sp>
@@ -6250,9 +5716,7 @@
             <a:avLst/>
           </a:prstGeom>
           <a:solidFill>
-            <a:schemeClr val="bg2">
-              <a:lumMod val="50000"/>
-            </a:schemeClr>
+            <a:srgbClr val="717FB3"/>
           </a:solidFill>
           <a:ln>
             <a:solidFill>
@@ -6453,61 +5917,19 @@
               <a:rPr lang="pt-BR" altLang="pt-BR" sz="1300" dirty="0">
                 <a:latin typeface="Calibri" panose="020F0502020204030204" pitchFamily="34" charset="0"/>
               </a:rPr>
-              <a:t>X</a:t>
-            </a:r>
-          </a:p>
-          <a:p>
-            <a:pPr algn="just" eaLnBrk="1" hangingPunct="1"/>
+              <a:t>Os resultados obtidos foram bastante satisfatórios pois além de atender ao que foi proposto, o </a:t>
+            </a:r>
+            <a:r>
+              <a:rPr lang="pt-BR" altLang="pt-BR" sz="1300" i="1" dirty="0">
+                <a:latin typeface="Calibri" panose="020F0502020204030204" pitchFamily="34" charset="0"/>
+              </a:rPr>
+              <a:t>software</a:t>
+            </a:r>
             <a:r>
               <a:rPr lang="pt-BR" altLang="pt-BR" sz="1300" dirty="0">
                 <a:latin typeface="Calibri" panose="020F0502020204030204" pitchFamily="34" charset="0"/>
               </a:rPr>
-              <a:t>X</a:t>
-            </a:r>
-          </a:p>
-          <a:p>
-            <a:pPr algn="just" eaLnBrk="1" hangingPunct="1"/>
-            <a:r>
-              <a:rPr lang="pt-BR" altLang="pt-BR" sz="1300" dirty="0">
-                <a:latin typeface="Calibri" panose="020F0502020204030204" pitchFamily="34" charset="0"/>
-              </a:rPr>
-              <a:t>X</a:t>
-            </a:r>
-          </a:p>
-          <a:p>
-            <a:pPr algn="just" eaLnBrk="1" hangingPunct="1"/>
-            <a:r>
-              <a:rPr lang="pt-BR" altLang="pt-BR" sz="1300" dirty="0">
-                <a:latin typeface="Calibri" panose="020F0502020204030204" pitchFamily="34" charset="0"/>
-              </a:rPr>
-              <a:t>X</a:t>
-            </a:r>
-          </a:p>
-          <a:p>
-            <a:pPr algn="just" eaLnBrk="1" hangingPunct="1"/>
-            <a:r>
-              <a:rPr lang="pt-BR" altLang="pt-BR" sz="1300" dirty="0">
-                <a:latin typeface="Calibri" panose="020F0502020204030204" pitchFamily="34" charset="0"/>
-              </a:rPr>
-              <a:t>X</a:t>
-            </a:r>
-          </a:p>
-          <a:p>
-            <a:pPr algn="just" eaLnBrk="1" hangingPunct="1"/>
-            <a:r>
-              <a:rPr lang="pt-BR" altLang="pt-BR" sz="1300" dirty="0">
-                <a:latin typeface="Calibri" panose="020F0502020204030204" pitchFamily="34" charset="0"/>
-              </a:rPr>
-              <a:t>X</a:t>
-            </a:r>
-          </a:p>
-          <a:p>
-            <a:pPr algn="just" eaLnBrk="1" hangingPunct="1"/>
-            <a:r>
-              <a:rPr lang="pt-BR" altLang="pt-BR" sz="1300" dirty="0">
-                <a:latin typeface="Calibri" panose="020F0502020204030204" pitchFamily="34" charset="0"/>
-              </a:rPr>
-              <a:t>x.</a:t>
+              <a:t> permite um elevado grau de extensão com melhorias e adição de novos recursos. Apesar do projeto ter tratado apenas de simplificação de expressões algébricas numéricas, é possível adicionar suporte a simplificação de polinômios, derivadas, integrais, etc.</a:t>
             </a:r>
           </a:p>
         </p:txBody>
@@ -6527,9 +5949,7 @@
             <a:avLst/>
           </a:prstGeom>
           <a:solidFill>
-            <a:schemeClr val="bg2">
-              <a:lumMod val="50000"/>
-            </a:schemeClr>
+            <a:srgbClr val="717FB3"/>
           </a:solidFill>
           <a:ln>
             <a:solidFill>
@@ -6725,77 +6145,327 @@
             </a:lvl9pPr>
           </a:lstStyle>
           <a:p>
-            <a:pPr algn="just" eaLnBrk="1" hangingPunct="1">
+            <a:pPr marL="228600" indent="-228600" algn="just" eaLnBrk="1" hangingPunct="1">
               <a:lnSpc>
                 <a:spcPct val="85000"/>
               </a:lnSpc>
               <a:spcAft>
                 <a:spcPct val="30000"/>
               </a:spcAft>
+              <a:buFont typeface="+mj-lt"/>
+              <a:buAutoNum type="arabicPeriod"/>
             </a:pPr>
             <a:r>
-              <a:rPr lang="pt-BR" altLang="pt-BR" sz="1200" dirty="0">
-                <a:latin typeface="Calibri" panose="020F0502020204030204" pitchFamily="34" charset="0"/>
-              </a:rPr>
-              <a:t>1.</a:t>
-            </a:r>
-          </a:p>
-          <a:p>
-            <a:pPr algn="just" eaLnBrk="1" hangingPunct="1">
+              <a:rPr lang="pt-BR" altLang="pt-BR" sz="780" dirty="0">
+                <a:latin typeface="Calibri" panose="020F0502020204030204" pitchFamily="34" charset="0"/>
+              </a:rPr>
+              <a:t>ANTLR. ANTLR 4 </a:t>
+            </a:r>
+            <a:r>
+              <a:rPr lang="pt-BR" altLang="pt-BR" sz="780" dirty="0" err="1">
+                <a:latin typeface="Calibri" panose="020F0502020204030204" pitchFamily="34" charset="0"/>
+              </a:rPr>
+              <a:t>documentation</a:t>
+            </a:r>
+            <a:r>
+              <a:rPr lang="pt-BR" altLang="pt-BR" sz="780" dirty="0">
+                <a:latin typeface="Calibri" panose="020F0502020204030204" pitchFamily="34" charset="0"/>
+              </a:rPr>
+              <a:t>. Disponível em: &lt;https://github.com/antlr/antlr4/blob/4.6/doc/index.md&gt;. Acesso em: 26 mar. 2017.</a:t>
+            </a:r>
+          </a:p>
+          <a:p>
+            <a:pPr marL="228600" indent="-228600" algn="just" eaLnBrk="1" hangingPunct="1">
               <a:lnSpc>
                 <a:spcPct val="85000"/>
               </a:lnSpc>
               <a:spcAft>
                 <a:spcPct val="30000"/>
               </a:spcAft>
+              <a:buFont typeface="+mj-lt"/>
+              <a:buAutoNum type="arabicPeriod"/>
             </a:pPr>
-            <a:endParaRPr lang="pt-BR" altLang="pt-BR" sz="1200" dirty="0">
-              <a:latin typeface="Calibri" panose="020F0502020204030204" pitchFamily="34" charset="0"/>
-            </a:endParaRPr>
-          </a:p>
-          <a:p>
-            <a:pPr algn="just" eaLnBrk="1" hangingPunct="1">
+            <a:r>
+              <a:rPr lang="pt-BR" altLang="pt-BR" sz="780" dirty="0">
+                <a:latin typeface="Calibri" panose="020F0502020204030204" pitchFamily="34" charset="0"/>
+              </a:rPr>
+              <a:t>APACHE GROOVY. </a:t>
+            </a:r>
+            <a:r>
+              <a:rPr lang="pt-BR" altLang="pt-BR" sz="780" dirty="0" err="1">
+                <a:latin typeface="Calibri" panose="020F0502020204030204" pitchFamily="34" charset="0"/>
+              </a:rPr>
+              <a:t>Integrating</a:t>
+            </a:r>
+            <a:r>
+              <a:rPr lang="pt-BR" altLang="pt-BR" sz="780" dirty="0">
+                <a:latin typeface="Calibri" panose="020F0502020204030204" pitchFamily="34" charset="0"/>
+              </a:rPr>
+              <a:t> </a:t>
+            </a:r>
+            <a:r>
+              <a:rPr lang="pt-BR" altLang="pt-BR" sz="780" dirty="0" err="1">
+                <a:latin typeface="Calibri" panose="020F0502020204030204" pitchFamily="34" charset="0"/>
+              </a:rPr>
+              <a:t>Groovy</a:t>
+            </a:r>
+            <a:r>
+              <a:rPr lang="pt-BR" altLang="pt-BR" sz="780" dirty="0">
+                <a:latin typeface="Calibri" panose="020F0502020204030204" pitchFamily="34" charset="0"/>
+              </a:rPr>
+              <a:t> </a:t>
+            </a:r>
+            <a:r>
+              <a:rPr lang="pt-BR" altLang="pt-BR" sz="780" dirty="0" err="1">
+                <a:latin typeface="Calibri" panose="020F0502020204030204" pitchFamily="34" charset="0"/>
+              </a:rPr>
+              <a:t>into</a:t>
+            </a:r>
+            <a:r>
+              <a:rPr lang="pt-BR" altLang="pt-BR" sz="780" dirty="0">
+                <a:latin typeface="Calibri" panose="020F0502020204030204" pitchFamily="34" charset="0"/>
+              </a:rPr>
+              <a:t> </a:t>
+            </a:r>
+            <a:r>
+              <a:rPr lang="pt-BR" altLang="pt-BR" sz="780" dirty="0" err="1">
+                <a:latin typeface="Calibri" panose="020F0502020204030204" pitchFamily="34" charset="0"/>
+              </a:rPr>
+              <a:t>applications</a:t>
+            </a:r>
+            <a:r>
+              <a:rPr lang="pt-BR" altLang="pt-BR" sz="780" dirty="0">
+                <a:latin typeface="Calibri" panose="020F0502020204030204" pitchFamily="34" charset="0"/>
+              </a:rPr>
+              <a:t>. Disponível em: &lt;http://groovy-lang.org/integrating.html&gt;. Acesso em: 20 mar. 2017.</a:t>
+            </a:r>
+          </a:p>
+          <a:p>
+            <a:pPr marL="228600" indent="-228600" algn="just" eaLnBrk="1" hangingPunct="1">
               <a:lnSpc>
                 <a:spcPct val="85000"/>
               </a:lnSpc>
               <a:spcAft>
                 <a:spcPct val="30000"/>
               </a:spcAft>
+              <a:buFont typeface="+mj-lt"/>
+              <a:buAutoNum type="arabicPeriod"/>
             </a:pPr>
             <a:r>
-              <a:rPr lang="pt-BR" altLang="pt-BR" sz="1200" dirty="0">
-                <a:latin typeface="Calibri" panose="020F0502020204030204" pitchFamily="34" charset="0"/>
-              </a:rPr>
-              <a:t>2.</a:t>
-            </a:r>
-          </a:p>
-          <a:p>
-            <a:pPr algn="just" eaLnBrk="1" hangingPunct="1">
+              <a:rPr lang="pt-BR" altLang="pt-BR" sz="780" dirty="0">
+                <a:latin typeface="Calibri" panose="020F0502020204030204" pitchFamily="34" charset="0"/>
+              </a:rPr>
+              <a:t>BECK, Kent. TDD: desenvolvimento guiado por testes. Porto Alegre: Bookman, 2010.</a:t>
+            </a:r>
+          </a:p>
+          <a:p>
+            <a:pPr marL="228600" indent="-228600" algn="just" eaLnBrk="1" hangingPunct="1">
               <a:lnSpc>
                 <a:spcPct val="85000"/>
               </a:lnSpc>
               <a:spcAft>
                 <a:spcPct val="30000"/>
               </a:spcAft>
+              <a:buFont typeface="+mj-lt"/>
+              <a:buAutoNum type="arabicPeriod"/>
             </a:pPr>
-            <a:endParaRPr lang="pt-BR" altLang="pt-BR" sz="1200" dirty="0">
-              <a:latin typeface="Calibri" panose="020F0502020204030204" pitchFamily="34" charset="0"/>
-            </a:endParaRPr>
-          </a:p>
-          <a:p>
-            <a:pPr algn="just" eaLnBrk="1" hangingPunct="1">
+            <a:r>
+              <a:rPr lang="pt-BR" altLang="pt-BR" sz="780" dirty="0">
+                <a:latin typeface="Calibri" panose="020F0502020204030204" pitchFamily="34" charset="0"/>
+              </a:rPr>
+              <a:t>EVANS, Eric. Domain-</a:t>
+            </a:r>
+            <a:r>
+              <a:rPr lang="pt-BR" altLang="pt-BR" sz="780" dirty="0" err="1">
+                <a:latin typeface="Calibri" panose="020F0502020204030204" pitchFamily="34" charset="0"/>
+              </a:rPr>
+              <a:t>driven</a:t>
+            </a:r>
+            <a:r>
+              <a:rPr lang="pt-BR" altLang="pt-BR" sz="780" dirty="0">
+                <a:latin typeface="Calibri" panose="020F0502020204030204" pitchFamily="34" charset="0"/>
+              </a:rPr>
+              <a:t> design: atacando as complexidades no coração do software. Rio de Janeiro: Alta Books, 2010.</a:t>
+            </a:r>
+          </a:p>
+          <a:p>
+            <a:pPr marL="228600" indent="-228600" algn="just" eaLnBrk="1" hangingPunct="1">
               <a:lnSpc>
                 <a:spcPct val="85000"/>
               </a:lnSpc>
               <a:spcAft>
                 <a:spcPct val="30000"/>
               </a:spcAft>
+              <a:buFont typeface="+mj-lt"/>
+              <a:buAutoNum type="arabicPeriod"/>
             </a:pPr>
             <a:r>
-              <a:rPr lang="pt-BR" altLang="pt-BR" sz="1200" dirty="0">
-                <a:latin typeface="Calibri" panose="020F0502020204030204" pitchFamily="34" charset="0"/>
-              </a:rPr>
-              <a:t>3.</a:t>
+              <a:rPr lang="pt-BR" altLang="pt-BR" sz="780" dirty="0">
+                <a:latin typeface="Calibri" panose="020F0502020204030204" pitchFamily="34" charset="0"/>
+              </a:rPr>
+              <a:t>FOWLER, Martin. </a:t>
+            </a:r>
+            <a:r>
+              <a:rPr lang="pt-BR" altLang="pt-BR" sz="780" dirty="0" err="1">
+                <a:latin typeface="Calibri" panose="020F0502020204030204" pitchFamily="34" charset="0"/>
+              </a:rPr>
+              <a:t>Inversion</a:t>
+            </a:r>
+            <a:r>
+              <a:rPr lang="pt-BR" altLang="pt-BR" sz="780" dirty="0">
+                <a:latin typeface="Calibri" panose="020F0502020204030204" pitchFamily="34" charset="0"/>
+              </a:rPr>
+              <a:t> </a:t>
+            </a:r>
+            <a:r>
+              <a:rPr lang="pt-BR" altLang="pt-BR" sz="780" dirty="0" err="1">
+                <a:latin typeface="Calibri" panose="020F0502020204030204" pitchFamily="34" charset="0"/>
+              </a:rPr>
+              <a:t>of</a:t>
+            </a:r>
+            <a:r>
+              <a:rPr lang="pt-BR" altLang="pt-BR" sz="780" dirty="0">
+                <a:latin typeface="Calibri" panose="020F0502020204030204" pitchFamily="34" charset="0"/>
+              </a:rPr>
+              <a:t> </a:t>
+            </a:r>
+            <a:r>
+              <a:rPr lang="pt-BR" altLang="pt-BR" sz="780" dirty="0" err="1">
+                <a:latin typeface="Calibri" panose="020F0502020204030204" pitchFamily="34" charset="0"/>
+              </a:rPr>
+              <a:t>control</a:t>
+            </a:r>
+            <a:r>
+              <a:rPr lang="pt-BR" altLang="pt-BR" sz="780" dirty="0">
+                <a:latin typeface="Calibri" panose="020F0502020204030204" pitchFamily="34" charset="0"/>
+              </a:rPr>
+              <a:t> containers </a:t>
+            </a:r>
+            <a:r>
+              <a:rPr lang="pt-BR" altLang="pt-BR" sz="780" dirty="0" err="1">
+                <a:latin typeface="Calibri" panose="020F0502020204030204" pitchFamily="34" charset="0"/>
+              </a:rPr>
+              <a:t>and</a:t>
+            </a:r>
+            <a:r>
+              <a:rPr lang="pt-BR" altLang="pt-BR" sz="780" dirty="0">
+                <a:latin typeface="Calibri" panose="020F0502020204030204" pitchFamily="34" charset="0"/>
+              </a:rPr>
+              <a:t> </a:t>
+            </a:r>
+            <a:r>
+              <a:rPr lang="pt-BR" altLang="pt-BR" sz="780" dirty="0" err="1">
+                <a:latin typeface="Calibri" panose="020F0502020204030204" pitchFamily="34" charset="0"/>
+              </a:rPr>
+              <a:t>the</a:t>
+            </a:r>
+            <a:r>
+              <a:rPr lang="pt-BR" altLang="pt-BR" sz="780" dirty="0">
+                <a:latin typeface="Calibri" panose="020F0502020204030204" pitchFamily="34" charset="0"/>
+              </a:rPr>
+              <a:t> </a:t>
+            </a:r>
+            <a:r>
+              <a:rPr lang="pt-BR" altLang="pt-BR" sz="780" dirty="0" err="1">
+                <a:latin typeface="Calibri" panose="020F0502020204030204" pitchFamily="34" charset="0"/>
+              </a:rPr>
+              <a:t>dependency</a:t>
+            </a:r>
+            <a:r>
+              <a:rPr lang="pt-BR" altLang="pt-BR" sz="780" dirty="0">
+                <a:latin typeface="Calibri" panose="020F0502020204030204" pitchFamily="34" charset="0"/>
+              </a:rPr>
+              <a:t> </a:t>
+            </a:r>
+            <a:r>
+              <a:rPr lang="pt-BR" altLang="pt-BR" sz="780" dirty="0" err="1">
+                <a:latin typeface="Calibri" panose="020F0502020204030204" pitchFamily="34" charset="0"/>
+              </a:rPr>
+              <a:t>injection</a:t>
+            </a:r>
+            <a:r>
+              <a:rPr lang="pt-BR" altLang="pt-BR" sz="780" dirty="0">
+                <a:latin typeface="Calibri" panose="020F0502020204030204" pitchFamily="34" charset="0"/>
+              </a:rPr>
+              <a:t> </a:t>
+            </a:r>
+            <a:r>
+              <a:rPr lang="pt-BR" altLang="pt-BR" sz="780" dirty="0" err="1">
+                <a:latin typeface="Calibri" panose="020F0502020204030204" pitchFamily="34" charset="0"/>
+              </a:rPr>
+              <a:t>pattern</a:t>
+            </a:r>
+            <a:r>
+              <a:rPr lang="pt-BR" altLang="pt-BR" sz="780" dirty="0">
+                <a:latin typeface="Calibri" panose="020F0502020204030204" pitchFamily="34" charset="0"/>
+              </a:rPr>
+              <a:t>. Disponível em &lt;https://martinfowler.com/articles/injection.html&gt;. Acesso em 20 mai. 2017.</a:t>
+            </a:r>
+          </a:p>
+          <a:p>
+            <a:pPr marL="228600" indent="-228600" algn="just" eaLnBrk="1" hangingPunct="1">
+              <a:lnSpc>
+                <a:spcPct val="85000"/>
+              </a:lnSpc>
+              <a:spcAft>
+                <a:spcPct val="30000"/>
+              </a:spcAft>
+              <a:buFont typeface="+mj-lt"/>
+              <a:buAutoNum type="arabicPeriod"/>
+            </a:pPr>
+            <a:r>
+              <a:rPr lang="pt-BR" altLang="pt-BR" sz="780" dirty="0">
+                <a:latin typeface="Calibri" panose="020F0502020204030204" pitchFamily="34" charset="0"/>
+              </a:rPr>
+              <a:t>GAMMA, Erich; HELM, Richard; JOHNSON, Ralph; VLISSIDES, John. Padrões de projetos: soluções reutilizáveis de software orientado a objetos. Porto Alegre: Bookman, 2000.</a:t>
+            </a:r>
+          </a:p>
+          <a:p>
+            <a:pPr marL="228600" indent="-228600" algn="just" eaLnBrk="1" hangingPunct="1">
+              <a:lnSpc>
+                <a:spcPct val="85000"/>
+              </a:lnSpc>
+              <a:spcAft>
+                <a:spcPct val="30000"/>
+              </a:spcAft>
+              <a:buFont typeface="+mj-lt"/>
+              <a:buAutoNum type="arabicPeriod"/>
+            </a:pPr>
+            <a:r>
+              <a:rPr lang="pt-BR" altLang="pt-BR" sz="780" dirty="0">
+                <a:latin typeface="Calibri" panose="020F0502020204030204" pitchFamily="34" charset="0"/>
+              </a:rPr>
+              <a:t>JAVA. Obtenha informações sobre a tecnologia </a:t>
+            </a:r>
+            <a:r>
+              <a:rPr lang="pt-BR" altLang="pt-BR" sz="780" dirty="0" err="1">
+                <a:latin typeface="Calibri" panose="020F0502020204030204" pitchFamily="34" charset="0"/>
+              </a:rPr>
+              <a:t>java</a:t>
+            </a:r>
+            <a:r>
+              <a:rPr lang="pt-BR" altLang="pt-BR" sz="780" dirty="0">
+                <a:latin typeface="Calibri" panose="020F0502020204030204" pitchFamily="34" charset="0"/>
+              </a:rPr>
+              <a:t>. Disponível em: &lt;https://www.java.com/pt_BR/about/&gt;. Acesso em: 22 mai. 2017.</a:t>
+            </a:r>
+          </a:p>
+          <a:p>
+            <a:pPr marL="228600" indent="-228600" algn="just" eaLnBrk="1" hangingPunct="1">
+              <a:lnSpc>
+                <a:spcPct val="85000"/>
+              </a:lnSpc>
+              <a:spcAft>
+                <a:spcPct val="30000"/>
+              </a:spcAft>
+              <a:buFont typeface="+mj-lt"/>
+              <a:buAutoNum type="arabicPeriod"/>
+            </a:pPr>
+            <a:r>
+              <a:rPr lang="pt-BR" altLang="pt-BR" sz="780" dirty="0">
+                <a:latin typeface="Calibri" panose="020F0502020204030204" pitchFamily="34" charset="0"/>
+              </a:rPr>
+              <a:t>LOUDEN, Kenneth C. Compiladores: princípios e práticas. São Paulo: Pioneira Thomson Learning, 2004.</a:t>
             </a:r>
           </a:p>
         </p:txBody>
@@ -6836,6 +6506,70 @@
           </a:ln>
         </p:spPr>
       </p:pic>
+      <p:pic>
+        <p:nvPicPr>
+          <p:cNvPr id="20" name="Imagem 19" descr="C:\Users\arabasso\Downloads\Screenshot-2017-11-4 Bassolve(2).png"/>
+          <p:cNvPicPr/>
+          <p:nvPr/>
+        </p:nvPicPr>
+        <p:blipFill>
+          <a:blip r:embed="rId4" cstate="print">
+            <a:extLst>
+              <a:ext uri="{28A0092B-C50C-407E-A947-70E740481C1C}">
+                <a14:useLocalDpi xmlns:a14="http://schemas.microsoft.com/office/drawing/2010/main" val="0"/>
+              </a:ext>
+            </a:extLst>
+          </a:blip>
+          <a:srcRect/>
+          <a:stretch>
+            <a:fillRect/>
+          </a:stretch>
+        </p:blipFill>
+        <p:spPr bwMode="auto">
+          <a:xfrm>
+            <a:off x="5317428" y="4607193"/>
+            <a:ext cx="4067136" cy="3412396"/>
+          </a:xfrm>
+          <a:prstGeom prst="rect">
+            <a:avLst/>
+          </a:prstGeom>
+          <a:noFill/>
+          <a:ln>
+            <a:solidFill>
+              <a:schemeClr val="tx1"/>
+            </a:solidFill>
+          </a:ln>
+        </p:spPr>
+      </p:pic>
+      <p:sp>
+        <p:nvSpPr>
+          <p:cNvPr id="2" name="CaixaDeTexto 1"/>
+          <p:cNvSpPr txBox="1"/>
+          <p:nvPr/>
+        </p:nvSpPr>
+        <p:spPr>
+          <a:xfrm>
+            <a:off x="5908475" y="7976310"/>
+            <a:ext cx="2848857" cy="261610"/>
+          </a:xfrm>
+          <a:prstGeom prst="rect">
+            <a:avLst/>
+          </a:prstGeom>
+          <a:noFill/>
+        </p:spPr>
+        <p:txBody>
+          <a:bodyPr wrap="none" rtlCol="0">
+            <a:spAutoFit/>
+          </a:bodyPr>
+          <a:lstStyle/>
+          <a:p>
+            <a:r>
+              <a:rPr lang="pt-BR" sz="1100" dirty="0"/>
+              <a:t>Figura 1: Simplificação de uma expressão.</a:t>
+            </a:r>
+          </a:p>
+        </p:txBody>
+      </p:sp>
     </p:spTree>
   </p:cSld>
   <p:clrMapOvr>

</xml_diff>